<commit_message>
Updated the payloads and .gitignore file
</commit_message>
<xml_diff>
--- a/Final Project/Food Delivery/Final Project Presentation.pptx
+++ b/Final Project/Food Delivery/Final Project Presentation.pptx
@@ -6952,6 +6952,12 @@
           <a:p>
             <a:r>
               <a:rPr lang="en-US" dirty="0"/>
+              <a:t>MVC pattern</a:t>
+            </a:r>
+          </a:p>
+          <a:p>
+            <a:r>
+              <a:rPr lang="en-US" dirty="0"/>
               <a:t>Visual Studio Code</a:t>
             </a:r>
           </a:p>

</xml_diff>